<commit_message>
adding devloper sms url
</commit_message>
<xml_diff>
--- a/Presentation.pptx
+++ b/Presentation.pptx
@@ -267,7 +267,7 @@
           <a:p>
             <a:fld id="{3C0037F0-C1E3-4945-9469-50A2CB64CFAE}" type="datetimeFigureOut">
               <a:rPr lang="en-US" smtClean="0"/>
-              <a:t>10/17/18</a:t>
+              <a:t>10/19/2018</a:t>
             </a:fld>
             <a:endParaRPr lang="en-US"/>
           </a:p>
@@ -465,7 +465,7 @@
           <a:p>
             <a:fld id="{3C0037F0-C1E3-4945-9469-50A2CB64CFAE}" type="datetimeFigureOut">
               <a:rPr lang="en-US" smtClean="0"/>
-              <a:t>10/17/18</a:t>
+              <a:t>10/19/2018</a:t>
             </a:fld>
             <a:endParaRPr lang="en-US"/>
           </a:p>
@@ -673,7 +673,7 @@
           <a:p>
             <a:fld id="{3C0037F0-C1E3-4945-9469-50A2CB64CFAE}" type="datetimeFigureOut">
               <a:rPr lang="en-US" smtClean="0"/>
-              <a:t>10/17/18</a:t>
+              <a:t>10/19/2018</a:t>
             </a:fld>
             <a:endParaRPr lang="en-US"/>
           </a:p>
@@ -871,7 +871,7 @@
           <a:p>
             <a:fld id="{3C0037F0-C1E3-4945-9469-50A2CB64CFAE}" type="datetimeFigureOut">
               <a:rPr lang="en-US" smtClean="0"/>
-              <a:t>10/17/18</a:t>
+              <a:t>10/19/2018</a:t>
             </a:fld>
             <a:endParaRPr lang="en-US"/>
           </a:p>
@@ -1146,7 +1146,7 @@
           <a:p>
             <a:fld id="{3C0037F0-C1E3-4945-9469-50A2CB64CFAE}" type="datetimeFigureOut">
               <a:rPr lang="en-US" smtClean="0"/>
-              <a:t>10/17/18</a:t>
+              <a:t>10/19/2018</a:t>
             </a:fld>
             <a:endParaRPr lang="en-US"/>
           </a:p>
@@ -1411,7 +1411,7 @@
           <a:p>
             <a:fld id="{3C0037F0-C1E3-4945-9469-50A2CB64CFAE}" type="datetimeFigureOut">
               <a:rPr lang="en-US" smtClean="0"/>
-              <a:t>10/17/18</a:t>
+              <a:t>10/19/2018</a:t>
             </a:fld>
             <a:endParaRPr lang="en-US"/>
           </a:p>
@@ -1823,7 +1823,7 @@
           <a:p>
             <a:fld id="{3C0037F0-C1E3-4945-9469-50A2CB64CFAE}" type="datetimeFigureOut">
               <a:rPr lang="en-US" smtClean="0"/>
-              <a:t>10/17/18</a:t>
+              <a:t>10/19/2018</a:t>
             </a:fld>
             <a:endParaRPr lang="en-US"/>
           </a:p>
@@ -1964,7 +1964,7 @@
           <a:p>
             <a:fld id="{3C0037F0-C1E3-4945-9469-50A2CB64CFAE}" type="datetimeFigureOut">
               <a:rPr lang="en-US" smtClean="0"/>
-              <a:t>10/17/18</a:t>
+              <a:t>10/19/2018</a:t>
             </a:fld>
             <a:endParaRPr lang="en-US"/>
           </a:p>
@@ -2077,7 +2077,7 @@
           <a:p>
             <a:fld id="{3C0037F0-C1E3-4945-9469-50A2CB64CFAE}" type="datetimeFigureOut">
               <a:rPr lang="en-US" smtClean="0"/>
-              <a:t>10/17/18</a:t>
+              <a:t>10/19/2018</a:t>
             </a:fld>
             <a:endParaRPr lang="en-US"/>
           </a:p>
@@ -2388,7 +2388,7 @@
           <a:p>
             <a:fld id="{3C0037F0-C1E3-4945-9469-50A2CB64CFAE}" type="datetimeFigureOut">
               <a:rPr lang="en-US" smtClean="0"/>
-              <a:t>10/17/18</a:t>
+              <a:t>10/19/2018</a:t>
             </a:fld>
             <a:endParaRPr lang="en-US"/>
           </a:p>
@@ -2676,7 +2676,7 @@
           <a:p>
             <a:fld id="{3C0037F0-C1E3-4945-9469-50A2CB64CFAE}" type="datetimeFigureOut">
               <a:rPr lang="en-US" smtClean="0"/>
-              <a:t>10/17/18</a:t>
+              <a:t>10/19/2018</a:t>
             </a:fld>
             <a:endParaRPr lang="en-US"/>
           </a:p>
@@ -2942,7 +2942,7 @@
           <a:p>
             <a:fld id="{3C0037F0-C1E3-4945-9469-50A2CB64CFAE}" type="datetimeFigureOut">
               <a:rPr lang="en-US" smtClean="0"/>
-              <a:t>10/17/18</a:t>
+              <a:t>10/19/2018</a:t>
             </a:fld>
             <a:endParaRPr lang="en-US"/>
           </a:p>

</xml_diff>